<commit_message>
updated presentation first page
</commit_message>
<xml_diff>
--- a/presentations/IETF_lamps.pptx
+++ b/presentations/IETF_lamps.pptx
@@ -6,14 +6,15 @@
   </p:sldMasterIdLst>
   <p:sldIdLst>
     <p:sldId id="1245026687" r:id="rId2"/>
-    <p:sldId id="267" r:id="rId3"/>
-    <p:sldId id="259" r:id="rId4"/>
-    <p:sldId id="262" r:id="rId5"/>
-    <p:sldId id="1245026686" r:id="rId6"/>
-    <p:sldId id="260" r:id="rId7"/>
-    <p:sldId id="1245026684" r:id="rId8"/>
-    <p:sldId id="1245026685" r:id="rId9"/>
-    <p:sldId id="1245026683" r:id="rId10"/>
+    <p:sldId id="1245026688" r:id="rId3"/>
+    <p:sldId id="267" r:id="rId4"/>
+    <p:sldId id="259" r:id="rId5"/>
+    <p:sldId id="262" r:id="rId6"/>
+    <p:sldId id="1245026686" r:id="rId7"/>
+    <p:sldId id="260" r:id="rId8"/>
+    <p:sldId id="1245026684" r:id="rId9"/>
+    <p:sldId id="1245026685" r:id="rId10"/>
+    <p:sldId id="1245026683" r:id="rId11"/>
   </p:sldIdLst>
   <p:sldSz cx="12192000" cy="6858000"/>
   <p:notesSz cx="6858000" cy="9144000"/>
@@ -112,6 +113,11 @@
       </a:defRPr>
     </a:lvl9pPr>
   </p:defaultTextStyle>
+  <p:extLst>
+    <p:ext uri="{EFAFB233-063F-42B5-8137-9DF3F51BA10A}">
+      <p15:sldGuideLst xmlns:p15="http://schemas.microsoft.com/office/powerpoint/2012/main"/>
+    </p:ext>
+  </p:extLst>
 </p:presentation>
 </file>
 
@@ -262,7 +268,7 @@
           <a:p>
             <a:fld id="{E702DFF1-5677-4476-8A6D-6A854743702E}" type="datetimeFigureOut">
               <a:rPr lang="en-US" smtClean="0"/>
-              <a:t>2/22/2022</a:t>
+              <a:t>3/4/22</a:t>
             </a:fld>
             <a:endParaRPr lang="en-US"/>
           </a:p>
@@ -460,7 +466,7 @@
           <a:p>
             <a:fld id="{E702DFF1-5677-4476-8A6D-6A854743702E}" type="datetimeFigureOut">
               <a:rPr lang="en-US" smtClean="0"/>
-              <a:t>2/22/2022</a:t>
+              <a:t>3/4/22</a:t>
             </a:fld>
             <a:endParaRPr lang="en-US"/>
           </a:p>
@@ -668,7 +674,7 @@
           <a:p>
             <a:fld id="{E702DFF1-5677-4476-8A6D-6A854743702E}" type="datetimeFigureOut">
               <a:rPr lang="en-US" smtClean="0"/>
-              <a:t>2/22/2022</a:t>
+              <a:t>3/4/22</a:t>
             </a:fld>
             <a:endParaRPr lang="en-US"/>
           </a:p>
@@ -866,7 +872,7 @@
           <a:p>
             <a:fld id="{E702DFF1-5677-4476-8A6D-6A854743702E}" type="datetimeFigureOut">
               <a:rPr lang="en-US" smtClean="0"/>
-              <a:t>2/22/2022</a:t>
+              <a:t>3/4/22</a:t>
             </a:fld>
             <a:endParaRPr lang="en-US"/>
           </a:p>
@@ -1141,7 +1147,7 @@
           <a:p>
             <a:fld id="{E702DFF1-5677-4476-8A6D-6A854743702E}" type="datetimeFigureOut">
               <a:rPr lang="en-US" smtClean="0"/>
-              <a:t>2/22/2022</a:t>
+              <a:t>3/4/22</a:t>
             </a:fld>
             <a:endParaRPr lang="en-US"/>
           </a:p>
@@ -1406,7 +1412,7 @@
           <a:p>
             <a:fld id="{E702DFF1-5677-4476-8A6D-6A854743702E}" type="datetimeFigureOut">
               <a:rPr lang="en-US" smtClean="0"/>
-              <a:t>2/22/2022</a:t>
+              <a:t>3/4/22</a:t>
             </a:fld>
             <a:endParaRPr lang="en-US"/>
           </a:p>
@@ -1818,7 +1824,7 @@
           <a:p>
             <a:fld id="{E702DFF1-5677-4476-8A6D-6A854743702E}" type="datetimeFigureOut">
               <a:rPr lang="en-US" smtClean="0"/>
-              <a:t>2/22/2022</a:t>
+              <a:t>3/4/22</a:t>
             </a:fld>
             <a:endParaRPr lang="en-US"/>
           </a:p>
@@ -1959,7 +1965,7 @@
           <a:p>
             <a:fld id="{E702DFF1-5677-4476-8A6D-6A854743702E}" type="datetimeFigureOut">
               <a:rPr lang="en-US" smtClean="0"/>
-              <a:t>2/22/2022</a:t>
+              <a:t>3/4/22</a:t>
             </a:fld>
             <a:endParaRPr lang="en-US"/>
           </a:p>
@@ -2072,7 +2078,7 @@
           <a:p>
             <a:fld id="{E702DFF1-5677-4476-8A6D-6A854743702E}" type="datetimeFigureOut">
               <a:rPr lang="en-US" smtClean="0"/>
-              <a:t>2/22/2022</a:t>
+              <a:t>3/4/22</a:t>
             </a:fld>
             <a:endParaRPr lang="en-US"/>
           </a:p>
@@ -2383,7 +2389,7 @@
           <a:p>
             <a:fld id="{E702DFF1-5677-4476-8A6D-6A854743702E}" type="datetimeFigureOut">
               <a:rPr lang="en-US" smtClean="0"/>
-              <a:t>2/22/2022</a:t>
+              <a:t>3/4/22</a:t>
             </a:fld>
             <a:endParaRPr lang="en-US"/>
           </a:p>
@@ -2671,7 +2677,7 @@
           <a:p>
             <a:fld id="{E702DFF1-5677-4476-8A6D-6A854743702E}" type="datetimeFigureOut">
               <a:rPr lang="en-US" smtClean="0"/>
-              <a:t>2/22/2022</a:t>
+              <a:t>3/4/22</a:t>
             </a:fld>
             <a:endParaRPr lang="en-US"/>
           </a:p>
@@ -2912,7 +2918,7 @@
           <a:p>
             <a:fld id="{E702DFF1-5677-4476-8A6D-6A854743702E}" type="datetimeFigureOut">
               <a:rPr lang="en-US" smtClean="0"/>
-              <a:t>2/22/2022</a:t>
+              <a:t>3/4/22</a:t>
             </a:fld>
             <a:endParaRPr lang="en-US"/>
           </a:p>
@@ -3458,6 +3464,179 @@
 </p:sld>
 </file>
 
+<file path=ppt/slides/slide10.xml><?xml version="1.0" encoding="utf-8"?>
+<p:sld xmlns:a="http://schemas.openxmlformats.org/drawingml/2006/main" xmlns:r="http://schemas.openxmlformats.org/officeDocument/2006/relationships" xmlns:p="http://schemas.openxmlformats.org/presentationml/2006/main">
+  <p:cSld>
+    <p:spTree>
+      <p:nvGrpSpPr>
+        <p:cNvPr id="1" name=""/>
+        <p:cNvGrpSpPr/>
+        <p:nvPr/>
+      </p:nvGrpSpPr>
+      <p:grpSpPr>
+        <a:xfrm>
+          <a:off x="0" y="0"/>
+          <a:ext cx="0" cy="0"/>
+          <a:chOff x="0" y="0"/>
+          <a:chExt cx="0" cy="0"/>
+        </a:xfrm>
+      </p:grpSpPr>
+      <p:sp>
+        <p:nvSpPr>
+          <p:cNvPr id="2" name="Title 1">
+            <a:extLst>
+              <a:ext uri="{FF2B5EF4-FFF2-40B4-BE49-F238E27FC236}">
+                <a16:creationId xmlns:a16="http://schemas.microsoft.com/office/drawing/2014/main" id="{5B48D3F8-5EAE-4071-B84D-55B3AA4CF79D}"/>
+              </a:ext>
+            </a:extLst>
+          </p:cNvPr>
+          <p:cNvSpPr>
+            <a:spLocks noGrp="1"/>
+          </p:cNvSpPr>
+          <p:nvPr>
+            <p:ph type="title"/>
+          </p:nvPr>
+        </p:nvSpPr>
+        <p:spPr/>
+        <p:txBody>
+          <a:bodyPr/>
+          <a:lstStyle/>
+          <a:p>
+            <a:pPr algn="ctr"/>
+            <a:r>
+              <a:rPr lang="en-US" dirty="0"/>
+              <a:t>What’s next?</a:t>
+            </a:r>
+          </a:p>
+        </p:txBody>
+      </p:sp>
+      <p:sp>
+        <p:nvSpPr>
+          <p:cNvPr id="3" name="Content Placeholder 2">
+            <a:extLst>
+              <a:ext uri="{FF2B5EF4-FFF2-40B4-BE49-F238E27FC236}">
+                <a16:creationId xmlns:a16="http://schemas.microsoft.com/office/drawing/2014/main" id="{DB8D91B9-8139-42CB-8355-035EB6FC1407}"/>
+              </a:ext>
+            </a:extLst>
+          </p:cNvPr>
+          <p:cNvSpPr>
+            <a:spLocks noGrp="1"/>
+          </p:cNvSpPr>
+          <p:nvPr>
+            <p:ph idx="1"/>
+          </p:nvPr>
+        </p:nvSpPr>
+        <p:spPr>
+          <a:xfrm>
+            <a:off x="838200" y="1690688"/>
+            <a:ext cx="7888705" cy="4486275"/>
+          </a:xfrm>
+        </p:spPr>
+        <p:txBody>
+          <a:bodyPr>
+            <a:normAutofit/>
+          </a:bodyPr>
+          <a:lstStyle/>
+          <a:p>
+            <a:r>
+              <a:rPr lang="en-US" dirty="0"/>
+              <a:t>Align with NIST on algorithm OIDs</a:t>
+            </a:r>
+          </a:p>
+          <a:p>
+            <a:r>
+              <a:rPr lang="en-US" dirty="0"/>
+              <a:t>Align with ETSI / OASIS SAM / PKCS11 / KMIP TC / more </a:t>
+            </a:r>
+          </a:p>
+          <a:p>
+            <a:r>
+              <a:rPr lang="en-US" dirty="0"/>
+              <a:t>Resolve issues around hybrid modes (IP, key serialization)</a:t>
+            </a:r>
+          </a:p>
+          <a:p>
+            <a:pPr lvl="1"/>
+            <a:r>
+              <a:rPr lang="en-US" dirty="0"/>
+              <a:t>Encouraged format for migration</a:t>
+            </a:r>
+          </a:p>
+          <a:p>
+            <a:pPr lvl="1"/>
+            <a:r>
+              <a:rPr lang="en-US" dirty="0"/>
+              <a:t>Path is uncertain</a:t>
+            </a:r>
+          </a:p>
+          <a:p>
+            <a:r>
+              <a:rPr lang="en-US" dirty="0"/>
+              <a:t>Alternate Round 3 candidates</a:t>
+            </a:r>
+          </a:p>
+        </p:txBody>
+      </p:sp>
+      <p:pic>
+        <p:nvPicPr>
+          <p:cNvPr id="1026" name="Picture 2" descr="What'S Next Yellow Sticker Note · Free image on Pixabay">
+            <a:extLst>
+              <a:ext uri="{FF2B5EF4-FFF2-40B4-BE49-F238E27FC236}">
+                <a16:creationId xmlns:a16="http://schemas.microsoft.com/office/drawing/2014/main" id="{D0287DF7-7294-4615-B5B7-D5B59B8B523D}"/>
+              </a:ext>
+            </a:extLst>
+          </p:cNvPr>
+          <p:cNvPicPr>
+            <a:picLocks noChangeAspect="1" noChangeArrowheads="1"/>
+          </p:cNvPicPr>
+          <p:nvPr/>
+        </p:nvPicPr>
+        <p:blipFill>
+          <a:blip r:embed="rId2">
+            <a:extLst>
+              <a:ext uri="{28A0092B-C50C-407E-A947-70E740481C1C}">
+                <a14:useLocalDpi xmlns:a14="http://schemas.microsoft.com/office/drawing/2010/main" val="0"/>
+              </a:ext>
+            </a:extLst>
+          </a:blip>
+          <a:srcRect/>
+          <a:stretch>
+            <a:fillRect/>
+          </a:stretch>
+        </p:blipFill>
+        <p:spPr bwMode="auto">
+          <a:xfrm>
+            <a:off x="8776943" y="2398639"/>
+            <a:ext cx="3070371" cy="3070371"/>
+          </a:xfrm>
+          <a:prstGeom prst="rect">
+            <a:avLst/>
+          </a:prstGeom>
+          <a:noFill/>
+          <a:extLst>
+            <a:ext uri="{909E8E84-426E-40DD-AFC4-6F175D3DCCD1}">
+              <a14:hiddenFill xmlns:a14="http://schemas.microsoft.com/office/drawing/2010/main">
+                <a:solidFill>
+                  <a:srgbClr val="FFFFFF"/>
+                </a:solidFill>
+              </a14:hiddenFill>
+            </a:ext>
+          </a:extLst>
+        </p:spPr>
+      </p:pic>
+    </p:spTree>
+    <p:extLst>
+      <p:ext uri="{BB962C8B-B14F-4D97-AF65-F5344CB8AC3E}">
+        <p14:creationId xmlns:p14="http://schemas.microsoft.com/office/powerpoint/2010/main" val="3609176506"/>
+      </p:ext>
+    </p:extLst>
+  </p:cSld>
+  <p:clrMapOvr>
+    <a:masterClrMapping/>
+  </p:clrMapOvr>
+</p:sld>
+</file>
+
 <file path=ppt/slides/slide2.xml><?xml version="1.0" encoding="utf-8"?>
 <p:sld xmlns:a="http://schemas.openxmlformats.org/drawingml/2006/main" xmlns:r="http://schemas.openxmlformats.org/officeDocument/2006/relationships" xmlns:p="http://schemas.openxmlformats.org/presentationml/2006/main">
   <p:cSld>
@@ -3522,103 +3701,107 @@
         </p:nvSpPr>
         <p:spPr>
           <a:xfrm>
-            <a:off x="838200" y="1438167"/>
-            <a:ext cx="10515600" cy="4886433"/>
+            <a:off x="838200" y="1948543"/>
+            <a:ext cx="10515600" cy="4376057"/>
           </a:xfrm>
         </p:spPr>
         <p:txBody>
           <a:bodyPr>
-            <a:normAutofit lnSpcReduction="10000"/>
+            <a:normAutofit fontScale="92500" lnSpcReduction="20000"/>
           </a:bodyPr>
           <a:lstStyle/>
           <a:p>
             <a:r>
               <a:rPr lang="en-US" dirty="0"/>
-              <a:t>To ensure correct communication key formats are serialized.</a:t>
-            </a:r>
-          </a:p>
-          <a:p>
-            <a:r>
-              <a:rPr lang="en-US" dirty="0"/>
-              <a:t>PQC key formats are unspecified, yet</a:t>
+              <a:t>NIST PQC submissions have single serialized structure for keys </a:t>
             </a:r>
           </a:p>
           <a:p>
             <a:pPr lvl="1"/>
             <a:r>
               <a:rPr lang="en-US" dirty="0"/>
-              <a:t>Different versions: Round 1, 2, 3, standardized</a:t>
+              <a:t>Each algorithm variant has an implicit key format </a:t>
             </a:r>
           </a:p>
           <a:p>
             <a:pPr lvl="1"/>
             <a:r>
               <a:rPr lang="en-US" dirty="0"/>
-              <a:t>Different compression choices</a:t>
+              <a:t>Nice in theory for removing parsing vulnerabilities</a:t>
             </a:r>
           </a:p>
           <a:p>
             <a:pPr lvl="1"/>
             <a:r>
               <a:rPr lang="en-US" dirty="0"/>
-              <a:t>Higher level (than crypto API) considerations:</a:t>
-            </a:r>
-          </a:p>
-          <a:p>
-            <a:pPr lvl="2"/>
-            <a:r>
-              <a:rPr lang="en-US" dirty="0"/>
-              <a:t>How to store / load the key from key formats (ordering)</a:t>
-            </a:r>
-          </a:p>
-          <a:p>
-            <a:pPr lvl="2"/>
-            <a:r>
-              <a:rPr lang="en-US" dirty="0"/>
-              <a:t>Optional choices (for performance / size considerations)</a:t>
+              <a:t>Nice in theory to tie an algorithm identifier to an implicit key format </a:t>
+            </a:r>
+          </a:p>
+          <a:p>
+            <a:r>
+              <a:rPr lang="en-US" dirty="0"/>
+              <a:t>In practice :</a:t>
             </a:r>
           </a:p>
           <a:p>
             <a:pPr lvl="1"/>
             <a:r>
               <a:rPr lang="en-US" dirty="0"/>
-              <a:t>Hybrid modes?</a:t>
-            </a:r>
-          </a:p>
-          <a:p>
-            <a:pPr marL="0" indent="0">
-              <a:buNone/>
-            </a:pPr>
+              <a:t>Many possible algorithm variants for a single scheme (E.g. Dilithium)</a:t>
+            </a:r>
+          </a:p>
+          <a:p>
+            <a:pPr lvl="1"/>
+            <a:r>
+              <a:rPr lang="en-US" dirty="0"/>
+              <a:t>Many submissions mention compression options</a:t>
+            </a:r>
+          </a:p>
+          <a:p>
+            <a:pPr lvl="1"/>
+            <a:r>
+              <a:rPr lang="en-US" dirty="0"/>
+              <a:t>An explosion in variants for hybrid schemes</a:t>
+            </a:r>
+          </a:p>
+          <a:p>
+            <a:pPr lvl="1"/>
+            <a:r>
+              <a:rPr lang="en-US" dirty="0"/>
+              <a:t>PQC Keys simply do not fit many legacy solutions </a:t>
+            </a:r>
+          </a:p>
+          <a:p>
+            <a:pPr lvl="1"/>
+            <a:r>
+              <a:rPr lang="en-US" dirty="0"/>
+              <a:t>Schemes already being deployed in production </a:t>
+            </a:r>
+          </a:p>
+          <a:p>
+            <a:pPr lvl="1"/>
+            <a:r>
+              <a:rPr lang="en-US" dirty="0"/>
+              <a:t>PQC Algorithms will continue to evolve together with the need to migrate keys for different versions</a:t>
+            </a:r>
+          </a:p>
+          <a:p>
+            <a:pPr lvl="1"/>
+            <a:r>
+              <a:rPr lang="en-US" dirty="0"/>
+              <a:t>Interop testing already hampered </a:t>
+            </a:r>
+          </a:p>
+          <a:p>
+            <a:pPr lvl="1"/>
             <a:endParaRPr lang="en-US" dirty="0"/>
-          </a:p>
-          <a:p>
-            <a:r>
-              <a:rPr lang="en-US" dirty="0"/>
-              <a:t>Popular submissions are being deployed in practice NOW (positive!) </a:t>
-            </a:r>
-            <a:r>
-              <a:rPr lang="en-US" dirty="0">
-                <a:sym typeface="Wingdings" panose="05000000000000000000" pitchFamily="2" charset="2"/>
-              </a:rPr>
-              <a:t></a:t>
-            </a:r>
-            <a:r>
-              <a:rPr lang="en-US" dirty="0"/>
-              <a:t>interoperability gets challenging</a:t>
-            </a:r>
-          </a:p>
-          <a:p>
-            <a:r>
-              <a:rPr lang="en-US" dirty="0"/>
-              <a:t>Solving this now will avoid larger problems in the future</a:t>
-            </a:r>
           </a:p>
         </p:txBody>
       </p:sp>
     </p:spTree>
     <p:extLst>
       <p:ext uri="{BB962C8B-B14F-4D97-AF65-F5344CB8AC3E}">
-        <p14:creationId xmlns:p14="http://schemas.microsoft.com/office/powerpoint/2010/main" val="1688107842"/>
+        <p14:creationId xmlns:p14="http://schemas.microsoft.com/office/powerpoint/2010/main" val="1514911462"/>
       </p:ext>
     </p:extLst>
   </p:cSld>
@@ -3650,7 +3833,7 @@
           <p:cNvPr id="2" name="Title 1">
             <a:extLst>
               <a:ext uri="{FF2B5EF4-FFF2-40B4-BE49-F238E27FC236}">
-                <a16:creationId xmlns:a16="http://schemas.microsoft.com/office/drawing/2014/main" id="{DFD17FBD-5DC0-4098-8809-F1ED8D52EBB9}"/>
+                <a16:creationId xmlns:a16="http://schemas.microsoft.com/office/drawing/2014/main" id="{2AEC6219-A27B-4F6E-A976-1821BC537D3A}"/>
               </a:ext>
             </a:extLst>
           </p:cNvPr>
@@ -3669,7 +3852,7 @@
             <a:pPr algn="ctr"/>
             <a:r>
               <a:rPr lang="en-US" dirty="0"/>
-              <a:t>Solution direction</a:t>
+              <a:t>PQC Key serialization and identification</a:t>
             </a:r>
           </a:p>
         </p:txBody>
@@ -3679,7 +3862,7 @@
           <p:cNvPr id="3" name="Content Placeholder 2">
             <a:extLst>
               <a:ext uri="{FF2B5EF4-FFF2-40B4-BE49-F238E27FC236}">
-                <a16:creationId xmlns:a16="http://schemas.microsoft.com/office/drawing/2014/main" id="{26B0A1AD-E1B6-4877-975A-2FCD5FC56431}"/>
+                <a16:creationId xmlns:a16="http://schemas.microsoft.com/office/drawing/2014/main" id="{00F6CCAF-6E9D-4F78-B0C4-4F7ECF0C0000}"/>
               </a:ext>
             </a:extLst>
           </p:cNvPr>
@@ -3690,54 +3873,129 @@
             <p:ph idx="1"/>
           </p:nvPr>
         </p:nvSpPr>
-        <p:spPr/>
-        <p:txBody>
-          <a:bodyPr/>
-          <a:lstStyle/>
-          <a:p>
-            <a:r>
-              <a:rPr lang="en-US" dirty="0"/>
-              <a:t>We cannot solve the world, but we can take first step in the right direction</a:t>
-            </a:r>
-          </a:p>
-          <a:p>
-            <a:r>
-              <a:rPr lang="en-US" dirty="0"/>
-              <a:t>An RFC specifying key formats will help</a:t>
+        <p:spPr>
+          <a:xfrm>
+            <a:off x="838200" y="1690688"/>
+            <a:ext cx="10515600" cy="4633912"/>
+          </a:xfrm>
+        </p:spPr>
+        <p:txBody>
+          <a:bodyPr>
+            <a:normAutofit fontScale="77500" lnSpcReduction="20000"/>
+          </a:bodyPr>
+          <a:lstStyle/>
+          <a:p>
+            <a:r>
+              <a:rPr lang="en-US" dirty="0"/>
+              <a:t>Goal: Make sure that PQC algorithms can be used by the largest number of applications – </a:t>
+            </a:r>
+            <a:r>
+              <a:rPr lang="en-US" b="1" i="1" dirty="0"/>
+              <a:t>safely</a:t>
+            </a:r>
+            <a:endParaRPr lang="en-US" dirty="0"/>
+          </a:p>
+          <a:p>
+            <a:pPr lvl="1">
+              <a:lnSpc>
+                <a:spcPct val="110000"/>
+              </a:lnSpc>
+            </a:pPr>
+            <a:r>
+              <a:rPr lang="en-US" sz="2600" dirty="0"/>
+              <a:t>Learning from past mistakes with ECC in reducing multiple standards</a:t>
+            </a:r>
+          </a:p>
+          <a:p>
+            <a:pPr lvl="1">
+              <a:lnSpc>
+                <a:spcPct val="110000"/>
+              </a:lnSpc>
+            </a:pPr>
+            <a:r>
+              <a:rPr lang="en-US" sz="2600" dirty="0"/>
+              <a:t>Allowing as much interoperability and experience building ahead of NISTs final standard </a:t>
+            </a:r>
+          </a:p>
+          <a:p>
+            <a:r>
+              <a:rPr lang="en-US" dirty="0"/>
+              <a:t>Approach </a:t>
+            </a:r>
+          </a:p>
+          <a:p>
+            <a:pPr lvl="1">
+              <a:lnSpc>
+                <a:spcPct val="110000"/>
+              </a:lnSpc>
+            </a:pPr>
+            <a:r>
+              <a:rPr lang="en-US" sz="2600" dirty="0"/>
+              <a:t>To ensure correct communication key formats are serialized.</a:t>
+            </a:r>
+          </a:p>
+          <a:p>
+            <a:pPr lvl="1">
+              <a:lnSpc>
+                <a:spcPct val="110000"/>
+              </a:lnSpc>
+            </a:pPr>
+            <a:r>
+              <a:rPr lang="en-US" sz="2600" dirty="0"/>
+              <a:t>To recognize the need for key compression and deal with it early in a safe way</a:t>
+            </a:r>
+          </a:p>
+          <a:p>
+            <a:pPr lvl="1">
+              <a:lnSpc>
+                <a:spcPct val="110000"/>
+              </a:lnSpc>
+            </a:pPr>
+            <a:r>
+              <a:rPr lang="en-US" sz="2600" dirty="0"/>
+              <a:t>To identify the best identification algorithm/key identification approach</a:t>
+            </a:r>
+          </a:p>
+          <a:p>
+            <a:pPr lvl="1">
+              <a:lnSpc>
+                <a:spcPct val="110000"/>
+              </a:lnSpc>
+            </a:pPr>
+            <a:r>
+              <a:rPr lang="en-US" sz="2600" dirty="0"/>
+              <a:t>Higher level (than crypto API) considerations:</a:t>
+            </a:r>
+          </a:p>
+          <a:p>
+            <a:pPr lvl="2"/>
+            <a:r>
+              <a:rPr lang="en-US" dirty="0"/>
+              <a:t>How to store / load the key from key formats (ordering)</a:t>
+            </a:r>
+          </a:p>
+          <a:p>
+            <a:pPr lvl="2"/>
+            <a:r>
+              <a:rPr lang="en-US" dirty="0"/>
+              <a:t>Optional choices (for performance / size considerations)</a:t>
             </a:r>
           </a:p>
           <a:p>
             <a:pPr lvl="1"/>
             <a:r>
               <a:rPr lang="en-US" dirty="0"/>
-              <a:t>Help manage algorithm versions and compatibility in key formats</a:t>
+              <a:t>Perhaps look at Hybrid modes?</a:t>
             </a:r>
           </a:p>
           <a:p>
             <a:pPr lvl="1"/>
-            <a:r>
-              <a:rPr lang="en-US" dirty="0"/>
-              <a:t>Help interoperability of both testing and integration</a:t>
-            </a:r>
-          </a:p>
-          <a:p>
-            <a:pPr lvl="1"/>
-            <a:r>
-              <a:rPr lang="en-US" dirty="0"/>
-              <a:t>Help make choices in future standards clear</a:t>
-            </a:r>
-          </a:p>
-          <a:p>
-            <a:pPr lvl="1"/>
-            <a:r>
-              <a:rPr lang="en-US" dirty="0"/>
-              <a:t>Help prevent delays in integration and adoption</a:t>
-            </a:r>
-          </a:p>
-          <a:p>
-            <a:r>
-              <a:rPr lang="en-US" dirty="0"/>
-              <a:t>Draft RFC “PQC Key Identification and Serialization” is shared with the cryptographic community</a:t>
+            <a:endParaRPr lang="en-US" dirty="0"/>
+          </a:p>
+          <a:p>
+            <a:r>
+              <a:rPr lang="en-US" dirty="0"/>
+              <a:t>Solving this now will avoid larger problems in the future</a:t>
             </a:r>
           </a:p>
         </p:txBody>
@@ -3745,7 +4003,7 @@
     </p:spTree>
     <p:extLst>
       <p:ext uri="{BB962C8B-B14F-4D97-AF65-F5344CB8AC3E}">
-        <p14:creationId xmlns:p14="http://schemas.microsoft.com/office/powerpoint/2010/main" val="3723357748"/>
+        <p14:creationId xmlns:p14="http://schemas.microsoft.com/office/powerpoint/2010/main" val="1688107842"/>
       </p:ext>
     </p:extLst>
   </p:cSld>
@@ -3777,7 +4035,7 @@
           <p:cNvPr id="2" name="Title 1">
             <a:extLst>
               <a:ext uri="{FF2B5EF4-FFF2-40B4-BE49-F238E27FC236}">
-                <a16:creationId xmlns:a16="http://schemas.microsoft.com/office/drawing/2014/main" id="{4F80B99A-26AF-46DE-B01D-69C7EB75A035}"/>
+                <a16:creationId xmlns:a16="http://schemas.microsoft.com/office/drawing/2014/main" id="{DFD17FBD-5DC0-4098-8809-F1ED8D52EBB9}"/>
               </a:ext>
             </a:extLst>
           </p:cNvPr>
@@ -3793,9 +4051,10 @@
           <a:bodyPr/>
           <a:lstStyle/>
           <a:p>
-            <a:r>
-              <a:rPr lang="en-US" dirty="0"/>
-              <a:t>Industry-wide observations</a:t>
+            <a:pPr algn="ctr"/>
+            <a:r>
+              <a:rPr lang="en-US" dirty="0"/>
+              <a:t>Solution direction</a:t>
             </a:r>
           </a:p>
         </p:txBody>
@@ -3805,7 +4064,7 @@
           <p:cNvPr id="3" name="Content Placeholder 2">
             <a:extLst>
               <a:ext uri="{FF2B5EF4-FFF2-40B4-BE49-F238E27FC236}">
-                <a16:creationId xmlns:a16="http://schemas.microsoft.com/office/drawing/2014/main" id="{8650BBC0-10BC-42D7-ABC1-79F484CA7A53}"/>
+                <a16:creationId xmlns:a16="http://schemas.microsoft.com/office/drawing/2014/main" id="{26B0A1AD-E1B6-4877-975A-2FCD5FC56431}"/>
               </a:ext>
             </a:extLst>
           </p:cNvPr>
@@ -3818,178 +4077,60 @@
         </p:nvSpPr>
         <p:spPr/>
         <p:txBody>
-          <a:bodyPr>
-            <a:normAutofit/>
-          </a:bodyPr>
-          <a:lstStyle/>
-          <a:p>
-            <a:pPr marL="0" indent="0">
-              <a:buNone/>
-            </a:pPr>
-            <a:r>
-              <a:rPr lang="en-US" dirty="0"/>
-              <a:t>Even at a limited deployment</a:t>
-            </a:r>
-            <a:r>
-              <a:rPr lang="en-US"/>
-              <a:t>, challenges are </a:t>
-            </a:r>
-            <a:r>
-              <a:rPr lang="en-US" dirty="0"/>
-              <a:t>arising</a:t>
+          <a:bodyPr/>
+          <a:lstStyle/>
+          <a:p>
+            <a:r>
+              <a:rPr lang="en-US" dirty="0"/>
+              <a:t>We cannot solve the world, but we can take first step in the right direction</a:t>
+            </a:r>
+          </a:p>
+          <a:p>
+            <a:r>
+              <a:rPr lang="en-US" dirty="0"/>
+              <a:t>An RFC specifying key formats will help</a:t>
             </a:r>
           </a:p>
           <a:p>
             <a:pPr lvl="1"/>
             <a:r>
               <a:rPr lang="en-US" dirty="0"/>
-              <a:t>Interoperability between crypto-libraries</a:t>
-            </a:r>
-          </a:p>
-          <a:p>
-            <a:pPr lvl="2"/>
-            <a:r>
-              <a:rPr lang="en-US" dirty="0"/>
-              <a:t>A </a:t>
-            </a:r>
-            <a:r>
-              <a:rPr lang="en-US" dirty="0" err="1"/>
-              <a:t>libOQS</a:t>
-            </a:r>
-            <a:r>
-              <a:rPr lang="en-US" dirty="0"/>
-              <a:t> issue was flagged*, where OQS and </a:t>
-            </a:r>
-            <a:r>
-              <a:rPr lang="en-US" dirty="0" err="1"/>
-              <a:t>Circl</a:t>
-            </a:r>
-            <a:r>
-              <a:rPr lang="en-US" dirty="0"/>
-              <a:t> were running different </a:t>
-            </a:r>
-            <a:r>
-              <a:rPr lang="en-US" dirty="0" err="1"/>
-              <a:t>Kyber</a:t>
-            </a:r>
-            <a:r>
-              <a:rPr lang="en-US" dirty="0"/>
-              <a:t> versions and confusion ensued</a:t>
+              <a:t>Help manage algorithm versions and compatibility in key formats</a:t>
             </a:r>
           </a:p>
           <a:p>
             <a:pPr lvl="1"/>
             <a:r>
               <a:rPr lang="en-US" dirty="0"/>
-              <a:t>Interoperability between test set-ups</a:t>
-            </a:r>
-          </a:p>
-          <a:p>
-            <a:pPr lvl="2"/>
-            <a:r>
-              <a:rPr lang="en-US" dirty="0"/>
-              <a:t>With each round/compression change, all devices need to be updated</a:t>
+              <a:t>Help interoperability of both testing and integration</a:t>
             </a:r>
           </a:p>
           <a:p>
             <a:pPr lvl="1"/>
             <a:r>
-              <a:rPr lang="en-US" dirty="0" err="1"/>
-              <a:t>Underspecification</a:t>
-            </a:r>
-            <a:r>
-              <a:rPr lang="en-US" dirty="0"/>
-              <a:t> of algorithms </a:t>
-            </a:r>
-          </a:p>
-          <a:p>
-            <a:pPr lvl="2"/>
-            <a:r>
-              <a:rPr lang="en-US" dirty="0"/>
-              <a:t>Reducing interoperability; different implementation choices </a:t>
-            </a:r>
-          </a:p>
-          <a:p>
-            <a:pPr lvl="2"/>
-            <a:r>
-              <a:rPr lang="en-US" dirty="0"/>
-              <a:t>Can even make wrong choices..</a:t>
+              <a:rPr lang="en-US" dirty="0"/>
+              <a:t>Help make choices in future standards clear</a:t>
             </a:r>
           </a:p>
           <a:p>
             <a:pPr lvl="1"/>
             <a:r>
               <a:rPr lang="en-US" dirty="0"/>
-              <a:t>Overspecification of algorithms</a:t>
-            </a:r>
-          </a:p>
-          <a:p>
-            <a:pPr lvl="2"/>
-            <a:r>
-              <a:rPr lang="en-US" dirty="0"/>
-              <a:t>Reduces adoption cross-industry; e.g. cloud versus embedded setting</a:t>
-            </a:r>
-          </a:p>
-          <a:p>
-            <a:pPr lvl="1"/>
-            <a:endParaRPr lang="en-US" dirty="0"/>
-          </a:p>
-        </p:txBody>
-      </p:sp>
-      <p:sp>
-        <p:nvSpPr>
-          <p:cNvPr id="4" name="TextBox 3">
-            <a:extLst>
-              <a:ext uri="{FF2B5EF4-FFF2-40B4-BE49-F238E27FC236}">
-                <a16:creationId xmlns:a16="http://schemas.microsoft.com/office/drawing/2014/main" id="{4EA8F144-0C91-4538-8DC9-35D817AA600D}"/>
-              </a:ext>
-            </a:extLst>
-          </p:cNvPr>
-          <p:cNvSpPr txBox="1"/>
-          <p:nvPr/>
-        </p:nvSpPr>
-        <p:spPr>
-          <a:xfrm>
-            <a:off x="8204433" y="6409189"/>
-            <a:ext cx="3280095" cy="461665"/>
-          </a:xfrm>
-          <a:prstGeom prst="rect">
-            <a:avLst/>
-          </a:prstGeom>
-          <a:noFill/>
-        </p:spPr>
-        <p:txBody>
-          <a:bodyPr wrap="square" rtlCol="0">
-            <a:spAutoFit/>
-          </a:bodyPr>
-          <a:lstStyle/>
-          <a:p>
-            <a:r>
-              <a:rPr lang="en-US" sz="1200" u="sng" dirty="0">
-                <a:hlinkClick r:id="rId2">
-                  <a:extLst>
-                    <a:ext uri="{A12FA001-AC4F-418D-AE19-62706E023703}">
-                      <ahyp:hlinkClr xmlns:ahyp="http://schemas.microsoft.com/office/drawing/2018/hyperlinkcolor" val="tx"/>
-                    </a:ext>
-                  </a:extLst>
-                </a:hlinkClick>
-              </a:rPr>
-              <a:t>* </a:t>
-            </a:r>
-            <a:r>
-              <a:rPr lang="en-US" sz="1200" u="sng" dirty="0">
-                <a:hlinkClick r:id="rId2"/>
-              </a:rPr>
-              <a:t>https://github.com/open-quantum-safe/liboqs/issues/909</a:t>
-            </a:r>
-            <a:endParaRPr lang="en-US" sz="1200" dirty="0"/>
+              <a:t>Help prevent delays in integration and adoption</a:t>
+            </a:r>
+          </a:p>
+          <a:p>
+            <a:r>
+              <a:rPr lang="en-US" dirty="0"/>
+              <a:t>Draft RFC “PQC Key Identification and Serialization” is shared with the cryptographic community</a:t>
+            </a:r>
           </a:p>
         </p:txBody>
       </p:sp>
     </p:spTree>
     <p:extLst>
       <p:ext uri="{BB962C8B-B14F-4D97-AF65-F5344CB8AC3E}">
-        <p14:creationId xmlns:p14="http://schemas.microsoft.com/office/powerpoint/2010/main" val="2623301628"/>
+        <p14:creationId xmlns:p14="http://schemas.microsoft.com/office/powerpoint/2010/main" val="3723357748"/>
       </p:ext>
     </p:extLst>
   </p:cSld>
@@ -4021,6 +4162,242 @@
           <p:cNvPr id="2" name="Title 1">
             <a:extLst>
               <a:ext uri="{FF2B5EF4-FFF2-40B4-BE49-F238E27FC236}">
+                <a16:creationId xmlns:a16="http://schemas.microsoft.com/office/drawing/2014/main" id="{4F80B99A-26AF-46DE-B01D-69C7EB75A035}"/>
+              </a:ext>
+            </a:extLst>
+          </p:cNvPr>
+          <p:cNvSpPr>
+            <a:spLocks noGrp="1"/>
+          </p:cNvSpPr>
+          <p:nvPr>
+            <p:ph type="title"/>
+          </p:nvPr>
+        </p:nvSpPr>
+        <p:spPr/>
+        <p:txBody>
+          <a:bodyPr/>
+          <a:lstStyle/>
+          <a:p>
+            <a:r>
+              <a:rPr lang="en-US" dirty="0"/>
+              <a:t>Industry-wide observations</a:t>
+            </a:r>
+          </a:p>
+        </p:txBody>
+      </p:sp>
+      <p:sp>
+        <p:nvSpPr>
+          <p:cNvPr id="3" name="Content Placeholder 2">
+            <a:extLst>
+              <a:ext uri="{FF2B5EF4-FFF2-40B4-BE49-F238E27FC236}">
+                <a16:creationId xmlns:a16="http://schemas.microsoft.com/office/drawing/2014/main" id="{8650BBC0-10BC-42D7-ABC1-79F484CA7A53}"/>
+              </a:ext>
+            </a:extLst>
+          </p:cNvPr>
+          <p:cNvSpPr>
+            <a:spLocks noGrp="1"/>
+          </p:cNvSpPr>
+          <p:nvPr>
+            <p:ph idx="1"/>
+          </p:nvPr>
+        </p:nvSpPr>
+        <p:spPr/>
+        <p:txBody>
+          <a:bodyPr>
+            <a:normAutofit/>
+          </a:bodyPr>
+          <a:lstStyle/>
+          <a:p>
+            <a:pPr marL="0" indent="0">
+              <a:buNone/>
+            </a:pPr>
+            <a:r>
+              <a:rPr lang="en-US" dirty="0"/>
+              <a:t>Even at a limited deployment, challenges are arising</a:t>
+            </a:r>
+          </a:p>
+          <a:p>
+            <a:pPr lvl="1"/>
+            <a:r>
+              <a:rPr lang="en-US" dirty="0"/>
+              <a:t>Interoperability between crypto-libraries</a:t>
+            </a:r>
+          </a:p>
+          <a:p>
+            <a:pPr lvl="2"/>
+            <a:r>
+              <a:rPr lang="en-US" dirty="0"/>
+              <a:t>A </a:t>
+            </a:r>
+            <a:r>
+              <a:rPr lang="en-US" dirty="0" err="1"/>
+              <a:t>libOQS</a:t>
+            </a:r>
+            <a:r>
+              <a:rPr lang="en-US" dirty="0"/>
+              <a:t> issue was flagged*, where OQS and </a:t>
+            </a:r>
+            <a:r>
+              <a:rPr lang="en-US" dirty="0" err="1"/>
+              <a:t>Circl</a:t>
+            </a:r>
+            <a:r>
+              <a:rPr lang="en-US" dirty="0"/>
+              <a:t> were running different </a:t>
+            </a:r>
+            <a:r>
+              <a:rPr lang="en-US" dirty="0" err="1"/>
+              <a:t>Kyber</a:t>
+            </a:r>
+            <a:r>
+              <a:rPr lang="en-US" dirty="0"/>
+              <a:t> versions and confusion ensued</a:t>
+            </a:r>
+          </a:p>
+          <a:p>
+            <a:pPr lvl="1"/>
+            <a:r>
+              <a:rPr lang="en-US" dirty="0"/>
+              <a:t>Interoperability between test set-ups</a:t>
+            </a:r>
+          </a:p>
+          <a:p>
+            <a:pPr lvl="2"/>
+            <a:r>
+              <a:rPr lang="en-US" dirty="0"/>
+              <a:t>With each round/compression change, all devices need to be updated</a:t>
+            </a:r>
+          </a:p>
+          <a:p>
+            <a:pPr lvl="1"/>
+            <a:r>
+              <a:rPr lang="en-US" dirty="0" err="1"/>
+              <a:t>Underspecification</a:t>
+            </a:r>
+            <a:r>
+              <a:rPr lang="en-US" dirty="0"/>
+              <a:t> of algorithms </a:t>
+            </a:r>
+          </a:p>
+          <a:p>
+            <a:pPr lvl="2"/>
+            <a:r>
+              <a:rPr lang="en-US" dirty="0"/>
+              <a:t>Reducing interoperability; different implementation choices </a:t>
+            </a:r>
+          </a:p>
+          <a:p>
+            <a:pPr lvl="2"/>
+            <a:r>
+              <a:rPr lang="en-US" dirty="0"/>
+              <a:t>Can even make wrong choices..</a:t>
+            </a:r>
+          </a:p>
+          <a:p>
+            <a:pPr lvl="1"/>
+            <a:r>
+              <a:rPr lang="en-US" dirty="0"/>
+              <a:t>Overspecification of algorithms</a:t>
+            </a:r>
+          </a:p>
+          <a:p>
+            <a:pPr lvl="2"/>
+            <a:r>
+              <a:rPr lang="en-US" dirty="0"/>
+              <a:t>Reduces adoption cross-industry; e.g. cloud versus embedded setting</a:t>
+            </a:r>
+          </a:p>
+          <a:p>
+            <a:pPr lvl="1"/>
+            <a:endParaRPr lang="en-US" dirty="0"/>
+          </a:p>
+        </p:txBody>
+      </p:sp>
+      <p:sp>
+        <p:nvSpPr>
+          <p:cNvPr id="4" name="TextBox 3">
+            <a:extLst>
+              <a:ext uri="{FF2B5EF4-FFF2-40B4-BE49-F238E27FC236}">
+                <a16:creationId xmlns:a16="http://schemas.microsoft.com/office/drawing/2014/main" id="{4EA8F144-0C91-4538-8DC9-35D817AA600D}"/>
+              </a:ext>
+            </a:extLst>
+          </p:cNvPr>
+          <p:cNvSpPr txBox="1"/>
+          <p:nvPr/>
+        </p:nvSpPr>
+        <p:spPr>
+          <a:xfrm>
+            <a:off x="8204433" y="6409189"/>
+            <a:ext cx="3280095" cy="461665"/>
+          </a:xfrm>
+          <a:prstGeom prst="rect">
+            <a:avLst/>
+          </a:prstGeom>
+          <a:noFill/>
+        </p:spPr>
+        <p:txBody>
+          <a:bodyPr wrap="square" rtlCol="0">
+            <a:spAutoFit/>
+          </a:bodyPr>
+          <a:lstStyle/>
+          <a:p>
+            <a:r>
+              <a:rPr lang="en-US" sz="1200" u="sng" dirty="0">
+                <a:hlinkClick r:id="rId2">
+                  <a:extLst>
+                    <a:ext uri="{A12FA001-AC4F-418D-AE19-62706E023703}">
+                      <ahyp:hlinkClr xmlns:ahyp="http://schemas.microsoft.com/office/drawing/2018/hyperlinkcolor" val="tx"/>
+                    </a:ext>
+                  </a:extLst>
+                </a:hlinkClick>
+              </a:rPr>
+              <a:t>* </a:t>
+            </a:r>
+            <a:r>
+              <a:rPr lang="en-US" sz="1200" u="sng" dirty="0">
+                <a:hlinkClick r:id="rId2"/>
+              </a:rPr>
+              <a:t>https://github.com/open-quantum-safe/liboqs/issues/909</a:t>
+            </a:r>
+            <a:endParaRPr lang="en-US" sz="1200" dirty="0"/>
+          </a:p>
+        </p:txBody>
+      </p:sp>
+    </p:spTree>
+    <p:extLst>
+      <p:ext uri="{BB962C8B-B14F-4D97-AF65-F5344CB8AC3E}">
+        <p14:creationId xmlns:p14="http://schemas.microsoft.com/office/powerpoint/2010/main" val="2623301628"/>
+      </p:ext>
+    </p:extLst>
+  </p:cSld>
+  <p:clrMapOvr>
+    <a:masterClrMapping/>
+  </p:clrMapOvr>
+</p:sld>
+</file>
+
+<file path=ppt/slides/slide6.xml><?xml version="1.0" encoding="utf-8"?>
+<p:sld xmlns:a="http://schemas.openxmlformats.org/drawingml/2006/main" xmlns:r="http://schemas.openxmlformats.org/officeDocument/2006/relationships" xmlns:p="http://schemas.openxmlformats.org/presentationml/2006/main">
+  <p:cSld>
+    <p:spTree>
+      <p:nvGrpSpPr>
+        <p:cNvPr id="1" name=""/>
+        <p:cNvGrpSpPr/>
+        <p:nvPr/>
+      </p:nvGrpSpPr>
+      <p:grpSpPr>
+        <a:xfrm>
+          <a:off x="0" y="0"/>
+          <a:ext cx="0" cy="0"/>
+          <a:chOff x="0" y="0"/>
+          <a:chExt cx="0" cy="0"/>
+        </a:xfrm>
+      </p:grpSpPr>
+      <p:sp>
+        <p:nvSpPr>
+          <p:cNvPr id="2" name="Title 1">
+            <a:extLst>
+              <a:ext uri="{FF2B5EF4-FFF2-40B4-BE49-F238E27FC236}">
                 <a16:creationId xmlns:a16="http://schemas.microsoft.com/office/drawing/2014/main" id="{DFD17FBD-5DC0-4098-8809-F1ED8D52EBB9}"/>
               </a:ext>
             </a:extLst>
@@ -4125,7 +4502,7 @@
 </p:sld>
 </file>
 
-<file path=ppt/slides/slide6.xml><?xml version="1.0" encoding="utf-8"?>
+<file path=ppt/slides/slide7.xml><?xml version="1.0" encoding="utf-8"?>
 <p:sld xmlns:a="http://schemas.openxmlformats.org/drawingml/2006/main" xmlns:r="http://schemas.openxmlformats.org/officeDocument/2006/relationships" xmlns:p="http://schemas.openxmlformats.org/presentationml/2006/main">
   <p:cSld>
     <p:spTree>
@@ -4287,7 +4664,7 @@
 </p:sld>
 </file>
 
-<file path=ppt/slides/slide7.xml><?xml version="1.0" encoding="utf-8"?>
+<file path=ppt/slides/slide8.xml><?xml version="1.0" encoding="utf-8"?>
 <p:sld xmlns:a="http://schemas.openxmlformats.org/drawingml/2006/main" xmlns:r="http://schemas.openxmlformats.org/officeDocument/2006/relationships" xmlns:p="http://schemas.openxmlformats.org/presentationml/2006/main">
   <p:cSld>
     <p:spTree>
@@ -4454,7 +4831,7 @@
 </p:sld>
 </file>
 
-<file path=ppt/slides/slide8.xml><?xml version="1.0" encoding="utf-8"?>
+<file path=ppt/slides/slide9.xml><?xml version="1.0" encoding="utf-8"?>
 <p:sld xmlns:a="http://schemas.openxmlformats.org/drawingml/2006/main" xmlns:r="http://schemas.openxmlformats.org/officeDocument/2006/relationships" xmlns:p="http://schemas.openxmlformats.org/presentationml/2006/main">
   <p:cSld>
     <p:spTree>
@@ -4685,179 +5062,6 @@
     <p:extLst>
       <p:ext uri="{BB962C8B-B14F-4D97-AF65-F5344CB8AC3E}">
         <p14:creationId xmlns:p14="http://schemas.microsoft.com/office/powerpoint/2010/main" val="1799994731"/>
-      </p:ext>
-    </p:extLst>
-  </p:cSld>
-  <p:clrMapOvr>
-    <a:masterClrMapping/>
-  </p:clrMapOvr>
-</p:sld>
-</file>
-
-<file path=ppt/slides/slide9.xml><?xml version="1.0" encoding="utf-8"?>
-<p:sld xmlns:a="http://schemas.openxmlformats.org/drawingml/2006/main" xmlns:r="http://schemas.openxmlformats.org/officeDocument/2006/relationships" xmlns:p="http://schemas.openxmlformats.org/presentationml/2006/main">
-  <p:cSld>
-    <p:spTree>
-      <p:nvGrpSpPr>
-        <p:cNvPr id="1" name=""/>
-        <p:cNvGrpSpPr/>
-        <p:nvPr/>
-      </p:nvGrpSpPr>
-      <p:grpSpPr>
-        <a:xfrm>
-          <a:off x="0" y="0"/>
-          <a:ext cx="0" cy="0"/>
-          <a:chOff x="0" y="0"/>
-          <a:chExt cx="0" cy="0"/>
-        </a:xfrm>
-      </p:grpSpPr>
-      <p:sp>
-        <p:nvSpPr>
-          <p:cNvPr id="2" name="Title 1">
-            <a:extLst>
-              <a:ext uri="{FF2B5EF4-FFF2-40B4-BE49-F238E27FC236}">
-                <a16:creationId xmlns:a16="http://schemas.microsoft.com/office/drawing/2014/main" id="{5B48D3F8-5EAE-4071-B84D-55B3AA4CF79D}"/>
-              </a:ext>
-            </a:extLst>
-          </p:cNvPr>
-          <p:cNvSpPr>
-            <a:spLocks noGrp="1"/>
-          </p:cNvSpPr>
-          <p:nvPr>
-            <p:ph type="title"/>
-          </p:nvPr>
-        </p:nvSpPr>
-        <p:spPr/>
-        <p:txBody>
-          <a:bodyPr/>
-          <a:lstStyle/>
-          <a:p>
-            <a:pPr algn="ctr"/>
-            <a:r>
-              <a:rPr lang="en-US" dirty="0"/>
-              <a:t>What’s next?</a:t>
-            </a:r>
-          </a:p>
-        </p:txBody>
-      </p:sp>
-      <p:sp>
-        <p:nvSpPr>
-          <p:cNvPr id="3" name="Content Placeholder 2">
-            <a:extLst>
-              <a:ext uri="{FF2B5EF4-FFF2-40B4-BE49-F238E27FC236}">
-                <a16:creationId xmlns:a16="http://schemas.microsoft.com/office/drawing/2014/main" id="{DB8D91B9-8139-42CB-8355-035EB6FC1407}"/>
-              </a:ext>
-            </a:extLst>
-          </p:cNvPr>
-          <p:cNvSpPr>
-            <a:spLocks noGrp="1"/>
-          </p:cNvSpPr>
-          <p:nvPr>
-            <p:ph idx="1"/>
-          </p:nvPr>
-        </p:nvSpPr>
-        <p:spPr>
-          <a:xfrm>
-            <a:off x="838200" y="1690688"/>
-            <a:ext cx="7888705" cy="4486275"/>
-          </a:xfrm>
-        </p:spPr>
-        <p:txBody>
-          <a:bodyPr>
-            <a:normAutofit/>
-          </a:bodyPr>
-          <a:lstStyle/>
-          <a:p>
-            <a:r>
-              <a:rPr lang="en-US" dirty="0"/>
-              <a:t>Align with NIST on algorithm OIDs</a:t>
-            </a:r>
-          </a:p>
-          <a:p>
-            <a:r>
-              <a:rPr lang="en-US" dirty="0"/>
-              <a:t>Align with ETSI / OASIS SAM / PKCS11 / KMIP TC / more </a:t>
-            </a:r>
-          </a:p>
-          <a:p>
-            <a:r>
-              <a:rPr lang="en-US" dirty="0"/>
-              <a:t>Resolve issues around hybrid modes (IP, key serialization)</a:t>
-            </a:r>
-          </a:p>
-          <a:p>
-            <a:pPr lvl="1"/>
-            <a:r>
-              <a:rPr lang="en-US" dirty="0"/>
-              <a:t>Encouraged format for migration</a:t>
-            </a:r>
-          </a:p>
-          <a:p>
-            <a:pPr lvl="1"/>
-            <a:r>
-              <a:rPr lang="en-US" dirty="0"/>
-              <a:t>Path is uncertain</a:t>
-            </a:r>
-          </a:p>
-          <a:p>
-            <a:r>
-              <a:rPr lang="en-US" dirty="0"/>
-              <a:t>Alternate Round 3 candidates</a:t>
-            </a:r>
-          </a:p>
-        </p:txBody>
-      </p:sp>
-      <p:pic>
-        <p:nvPicPr>
-          <p:cNvPr id="1026" name="Picture 2" descr="What'S Next Yellow Sticker Note · Free image on Pixabay">
-            <a:extLst>
-              <a:ext uri="{FF2B5EF4-FFF2-40B4-BE49-F238E27FC236}">
-                <a16:creationId xmlns:a16="http://schemas.microsoft.com/office/drawing/2014/main" id="{D0287DF7-7294-4615-B5B7-D5B59B8B523D}"/>
-              </a:ext>
-            </a:extLst>
-          </p:cNvPr>
-          <p:cNvPicPr>
-            <a:picLocks noChangeAspect="1" noChangeArrowheads="1"/>
-          </p:cNvPicPr>
-          <p:nvPr/>
-        </p:nvPicPr>
-        <p:blipFill>
-          <a:blip r:embed="rId2">
-            <a:extLst>
-              <a:ext uri="{28A0092B-C50C-407E-A947-70E740481C1C}">
-                <a14:useLocalDpi xmlns:a14="http://schemas.microsoft.com/office/drawing/2010/main" val="0"/>
-              </a:ext>
-            </a:extLst>
-          </a:blip>
-          <a:srcRect/>
-          <a:stretch>
-            <a:fillRect/>
-          </a:stretch>
-        </p:blipFill>
-        <p:spPr bwMode="auto">
-          <a:xfrm>
-            <a:off x="8776943" y="2398639"/>
-            <a:ext cx="3070371" cy="3070371"/>
-          </a:xfrm>
-          <a:prstGeom prst="rect">
-            <a:avLst/>
-          </a:prstGeom>
-          <a:noFill/>
-          <a:extLst>
-            <a:ext uri="{909E8E84-426E-40DD-AFC4-6F175D3DCCD1}">
-              <a14:hiddenFill xmlns:a14="http://schemas.microsoft.com/office/drawing/2010/main">
-                <a:solidFill>
-                  <a:srgbClr val="FFFFFF"/>
-                </a:solidFill>
-              </a14:hiddenFill>
-            </a:ext>
-          </a:extLst>
-        </p:spPr>
-      </p:pic>
-    </p:spTree>
-    <p:extLst>
-      <p:ext uri="{BB962C8B-B14F-4D97-AF65-F5344CB8AC3E}">
-        <p14:creationId xmlns:p14="http://schemas.microsoft.com/office/powerpoint/2010/main" val="3609176506"/>
       </p:ext>
     </p:extLst>
   </p:cSld>

</xml_diff>